<commit_message>
Worked on the paper a lot and started to imagine what the post will look like
</commit_message>
<xml_diff>
--- a/Poster/Draft Poster 1.pptx
+++ b/Poster/Draft Poster 1.pptx
@@ -6,6 +6,7 @@
   </p:sldMasterIdLst>
   <p:sldIdLst>
     <p:sldId id="256" r:id="rId2"/>
+    <p:sldId id="257" r:id="rId3"/>
   </p:sldIdLst>
   <p:sldSz cx="43891200" cy="32918400"/>
   <p:notesSz cx="6858000" cy="9144000"/>
@@ -104,6 +105,11 @@
       </a:defRPr>
     </a:lvl9pPr>
   </p:defaultTextStyle>
+  <p:extLst>
+    <p:ext uri="{EFAFB233-063F-42B5-8137-9DF3F51BA10A}">
+      <p15:sldGuideLst xmlns:p15="http://schemas.microsoft.com/office/powerpoint/2012/main"/>
+    </p:ext>
+  </p:extLst>
 </p:presentation>
 </file>
 
@@ -238,7 +244,7 @@
           <a:p>
             <a:fld id="{F41C2562-C414-48F0-B6A8-C2A2CC007AC1}" type="datetimeFigureOut">
               <a:rPr lang="en-US" smtClean="0"/>
-              <a:t>11/14/2020</a:t>
+              <a:t>12/6/2020</a:t>
             </a:fld>
             <a:endParaRPr lang="en-US"/>
           </a:p>
@@ -408,7 +414,7 @@
           <a:p>
             <a:fld id="{F41C2562-C414-48F0-B6A8-C2A2CC007AC1}" type="datetimeFigureOut">
               <a:rPr lang="en-US" smtClean="0"/>
-              <a:t>11/14/2020</a:t>
+              <a:t>12/6/2020</a:t>
             </a:fld>
             <a:endParaRPr lang="en-US"/>
           </a:p>
@@ -588,7 +594,7 @@
           <a:p>
             <a:fld id="{F41C2562-C414-48F0-B6A8-C2A2CC007AC1}" type="datetimeFigureOut">
               <a:rPr lang="en-US" smtClean="0"/>
-              <a:t>11/14/2020</a:t>
+              <a:t>12/6/2020</a:t>
             </a:fld>
             <a:endParaRPr lang="en-US"/>
           </a:p>
@@ -758,7 +764,7 @@
           <a:p>
             <a:fld id="{F41C2562-C414-48F0-B6A8-C2A2CC007AC1}" type="datetimeFigureOut">
               <a:rPr lang="en-US" smtClean="0"/>
-              <a:t>11/14/2020</a:t>
+              <a:t>12/6/2020</a:t>
             </a:fld>
             <a:endParaRPr lang="en-US"/>
           </a:p>
@@ -1002,7 +1008,7 @@
           <a:p>
             <a:fld id="{F41C2562-C414-48F0-B6A8-C2A2CC007AC1}" type="datetimeFigureOut">
               <a:rPr lang="en-US" smtClean="0"/>
-              <a:t>11/14/2020</a:t>
+              <a:t>12/6/2020</a:t>
             </a:fld>
             <a:endParaRPr lang="en-US"/>
           </a:p>
@@ -1234,7 +1240,7 @@
           <a:p>
             <a:fld id="{F41C2562-C414-48F0-B6A8-C2A2CC007AC1}" type="datetimeFigureOut">
               <a:rPr lang="en-US" smtClean="0"/>
-              <a:t>11/14/2020</a:t>
+              <a:t>12/6/2020</a:t>
             </a:fld>
             <a:endParaRPr lang="en-US"/>
           </a:p>
@@ -1601,7 +1607,7 @@
           <a:p>
             <a:fld id="{F41C2562-C414-48F0-B6A8-C2A2CC007AC1}" type="datetimeFigureOut">
               <a:rPr lang="en-US" smtClean="0"/>
-              <a:t>11/14/2020</a:t>
+              <a:t>12/6/2020</a:t>
             </a:fld>
             <a:endParaRPr lang="en-US"/>
           </a:p>
@@ -1719,7 +1725,7 @@
           <a:p>
             <a:fld id="{F41C2562-C414-48F0-B6A8-C2A2CC007AC1}" type="datetimeFigureOut">
               <a:rPr lang="en-US" smtClean="0"/>
-              <a:t>11/14/2020</a:t>
+              <a:t>12/6/2020</a:t>
             </a:fld>
             <a:endParaRPr lang="en-US"/>
           </a:p>
@@ -1814,7 +1820,7 @@
           <a:p>
             <a:fld id="{F41C2562-C414-48F0-B6A8-C2A2CC007AC1}" type="datetimeFigureOut">
               <a:rPr lang="en-US" smtClean="0"/>
-              <a:t>11/14/2020</a:t>
+              <a:t>12/6/2020</a:t>
             </a:fld>
             <a:endParaRPr lang="en-US"/>
           </a:p>
@@ -2091,7 +2097,7 @@
           <a:p>
             <a:fld id="{F41C2562-C414-48F0-B6A8-C2A2CC007AC1}" type="datetimeFigureOut">
               <a:rPr lang="en-US" smtClean="0"/>
-              <a:t>11/14/2020</a:t>
+              <a:t>12/6/2020</a:t>
             </a:fld>
             <a:endParaRPr lang="en-US"/>
           </a:p>
@@ -2348,7 +2354,7 @@
           <a:p>
             <a:fld id="{F41C2562-C414-48F0-B6A8-C2A2CC007AC1}" type="datetimeFigureOut">
               <a:rPr lang="en-US" smtClean="0"/>
-              <a:t>11/14/2020</a:t>
+              <a:t>12/6/2020</a:t>
             </a:fld>
             <a:endParaRPr lang="en-US"/>
           </a:p>
@@ -2561,7 +2567,7 @@
           <a:p>
             <a:fld id="{F41C2562-C414-48F0-B6A8-C2A2CC007AC1}" type="datetimeFigureOut">
               <a:rPr lang="en-US" smtClean="0"/>
-              <a:t>11/14/2020</a:t>
+              <a:t>12/6/2020</a:t>
             </a:fld>
             <a:endParaRPr lang="en-US"/>
           </a:p>
@@ -2952,6 +2958,21 @@
 <file path=ppt/slides/slide1.xml><?xml version="1.0" encoding="utf-8"?>
 <p:sld xmlns:a="http://schemas.openxmlformats.org/drawingml/2006/main" xmlns:r="http://schemas.openxmlformats.org/officeDocument/2006/relationships" xmlns:p="http://schemas.openxmlformats.org/presentationml/2006/main">
   <p:cSld>
+    <p:bg>
+      <p:bgPr>
+        <a:blipFill dpi="0" rotWithShape="1">
+          <a:blip r:embed="rId2">
+            <a:alphaModFix amt="75000"/>
+            <a:lum/>
+          </a:blip>
+          <a:srcRect/>
+          <a:stretch>
+            <a:fillRect l="-25000" r="-28000"/>
+          </a:stretch>
+        </a:blipFill>
+        <a:effectLst/>
+      </p:bgPr>
+    </p:bg>
     <p:spTree>
       <p:nvGrpSpPr>
         <p:cNvPr id="1" name=""/>
@@ -2966,10 +2987,648 @@
           <a:chExt cx="0" cy="0"/>
         </a:xfrm>
       </p:grpSpPr>
+      <p:sp>
+        <p:nvSpPr>
+          <p:cNvPr id="2" name="TextBox 1">
+            <a:extLst>
+              <a:ext uri="{FF2B5EF4-FFF2-40B4-BE49-F238E27FC236}">
+                <a16:creationId xmlns:a16="http://schemas.microsoft.com/office/drawing/2014/main" id="{1405C972-E232-4614-90D0-5E14519E9BDA}"/>
+              </a:ext>
+            </a:extLst>
+          </p:cNvPr>
+          <p:cNvSpPr txBox="1"/>
+          <p:nvPr/>
+        </p:nvSpPr>
+        <p:spPr>
+          <a:xfrm>
+            <a:off x="0" y="0"/>
+            <a:ext cx="43891200" cy="3708708"/>
+          </a:xfrm>
+          <a:prstGeom prst="rect">
+            <a:avLst/>
+          </a:prstGeom>
+          <a:noFill/>
+        </p:spPr>
+        <p:txBody>
+          <a:bodyPr wrap="square" rtlCol="0">
+            <a:spAutoFit/>
+          </a:bodyPr>
+          <a:lstStyle/>
+          <a:p>
+            <a:pPr algn="ctr"/>
+            <a:r>
+              <a:rPr lang="en-US" sz="11500" dirty="0"/>
+              <a:t>Personal &amp; Sustainable Strategies to Prevent Work-Related Burnout</a:t>
+            </a:r>
+          </a:p>
+          <a:p>
+            <a:pPr algn="ctr"/>
+            <a:r>
+              <a:rPr lang="en-US" sz="6000" dirty="0"/>
+              <a:t>Major: Applied Computing, Minor: Consciousness &amp; Creativity</a:t>
+            </a:r>
+          </a:p>
+          <a:p>
+            <a:pPr algn="ctr"/>
+            <a:r>
+              <a:rPr lang="en-US" sz="6000" dirty="0"/>
+              <a:t>By: Gabriel Smith-Dalrymple</a:t>
+            </a:r>
+          </a:p>
+        </p:txBody>
+      </p:sp>
+      <p:sp>
+        <p:nvSpPr>
+          <p:cNvPr id="3" name="TextBox 2">
+            <a:extLst>
+              <a:ext uri="{FF2B5EF4-FFF2-40B4-BE49-F238E27FC236}">
+                <a16:creationId xmlns:a16="http://schemas.microsoft.com/office/drawing/2014/main" id="{5F6FB757-58A7-49F9-B217-22173CB07168}"/>
+              </a:ext>
+            </a:extLst>
+          </p:cNvPr>
+          <p:cNvSpPr txBox="1"/>
+          <p:nvPr/>
+        </p:nvSpPr>
+        <p:spPr>
+          <a:xfrm>
+            <a:off x="0" y="31287184"/>
+            <a:ext cx="43891200" cy="1631216"/>
+          </a:xfrm>
+          <a:prstGeom prst="rect">
+            <a:avLst/>
+          </a:prstGeom>
+          <a:noFill/>
+        </p:spPr>
+        <p:txBody>
+          <a:bodyPr wrap="square" rtlCol="0">
+            <a:spAutoFit/>
+          </a:bodyPr>
+          <a:lstStyle/>
+          <a:p>
+            <a:pPr algn="ctr"/>
+            <a:r>
+              <a:rPr lang="en-US" sz="10000" dirty="0"/>
+              <a:t>University of Washington | Bothell</a:t>
+            </a:r>
+          </a:p>
+        </p:txBody>
+      </p:sp>
+      <p:sp>
+        <p:nvSpPr>
+          <p:cNvPr id="6" name="Rectangle: Rounded Corners 5">
+            <a:extLst>
+              <a:ext uri="{FF2B5EF4-FFF2-40B4-BE49-F238E27FC236}">
+                <a16:creationId xmlns:a16="http://schemas.microsoft.com/office/drawing/2014/main" id="{FCFF9C8C-0BA0-42E7-AD9A-711B4C56BADC}"/>
+              </a:ext>
+            </a:extLst>
+          </p:cNvPr>
+          <p:cNvSpPr/>
+          <p:nvPr/>
+        </p:nvSpPr>
+        <p:spPr>
+          <a:xfrm>
+            <a:off x="174169" y="4659085"/>
+            <a:ext cx="15109364" cy="8191060"/>
+          </a:xfrm>
+          <a:prstGeom prst="roundRect">
+            <a:avLst/>
+          </a:prstGeom>
+          <a:solidFill>
+            <a:schemeClr val="accent1">
+              <a:alpha val="70000"/>
+            </a:schemeClr>
+          </a:solidFill>
+        </p:spPr>
+        <p:style>
+          <a:lnRef idx="2">
+            <a:schemeClr val="accent1">
+              <a:shade val="50000"/>
+            </a:schemeClr>
+          </a:lnRef>
+          <a:fillRef idx="1">
+            <a:schemeClr val="accent1"/>
+          </a:fillRef>
+          <a:effectRef idx="0">
+            <a:schemeClr val="accent1"/>
+          </a:effectRef>
+          <a:fontRef idx="minor">
+            <a:schemeClr val="lt1"/>
+          </a:fontRef>
+        </p:style>
+        <p:txBody>
+          <a:bodyPr rtlCol="0" anchor="ctr"/>
+          <a:lstStyle/>
+          <a:p>
+            <a:pPr algn="ctr"/>
+            <a:r>
+              <a:rPr lang="en-US" sz="6000" dirty="0"/>
+              <a:t>Introduction</a:t>
+            </a:r>
+          </a:p>
+        </p:txBody>
+      </p:sp>
+      <p:sp>
+        <p:nvSpPr>
+          <p:cNvPr id="8" name="Rectangle: Rounded Corners 7">
+            <a:extLst>
+              <a:ext uri="{FF2B5EF4-FFF2-40B4-BE49-F238E27FC236}">
+                <a16:creationId xmlns:a16="http://schemas.microsoft.com/office/drawing/2014/main" id="{12F0F759-1229-4714-B841-3F84D0546AD4}"/>
+              </a:ext>
+            </a:extLst>
+          </p:cNvPr>
+          <p:cNvSpPr/>
+          <p:nvPr/>
+        </p:nvSpPr>
+        <p:spPr>
+          <a:xfrm>
+            <a:off x="174169" y="13577181"/>
+            <a:ext cx="15109364" cy="8191060"/>
+          </a:xfrm>
+          <a:prstGeom prst="roundRect">
+            <a:avLst/>
+          </a:prstGeom>
+          <a:solidFill>
+            <a:schemeClr val="accent1">
+              <a:alpha val="70000"/>
+            </a:schemeClr>
+          </a:solidFill>
+        </p:spPr>
+        <p:style>
+          <a:lnRef idx="2">
+            <a:schemeClr val="accent1">
+              <a:shade val="50000"/>
+            </a:schemeClr>
+          </a:lnRef>
+          <a:fillRef idx="1">
+            <a:schemeClr val="accent1"/>
+          </a:fillRef>
+          <a:effectRef idx="0">
+            <a:schemeClr val="accent1"/>
+          </a:effectRef>
+          <a:fontRef idx="minor">
+            <a:schemeClr val="lt1"/>
+          </a:fontRef>
+        </p:style>
+        <p:txBody>
+          <a:bodyPr rtlCol="0" anchor="ctr"/>
+          <a:lstStyle/>
+          <a:p>
+            <a:pPr algn="ctr"/>
+            <a:r>
+              <a:rPr lang="en-US" sz="6000" dirty="0"/>
+              <a:t>Background</a:t>
+            </a:r>
+          </a:p>
+        </p:txBody>
+      </p:sp>
+      <p:sp>
+        <p:nvSpPr>
+          <p:cNvPr id="9" name="Rectangle: Rounded Corners 8">
+            <a:extLst>
+              <a:ext uri="{FF2B5EF4-FFF2-40B4-BE49-F238E27FC236}">
+                <a16:creationId xmlns:a16="http://schemas.microsoft.com/office/drawing/2014/main" id="{FCD5190A-2F27-43F9-9C6B-097CF6777B07}"/>
+              </a:ext>
+            </a:extLst>
+          </p:cNvPr>
+          <p:cNvSpPr/>
+          <p:nvPr/>
+        </p:nvSpPr>
+        <p:spPr>
+          <a:xfrm>
+            <a:off x="174169" y="22495278"/>
+            <a:ext cx="15109364" cy="8191060"/>
+          </a:xfrm>
+          <a:prstGeom prst="roundRect">
+            <a:avLst/>
+          </a:prstGeom>
+          <a:solidFill>
+            <a:schemeClr val="accent1">
+              <a:alpha val="70000"/>
+            </a:schemeClr>
+          </a:solidFill>
+        </p:spPr>
+        <p:style>
+          <a:lnRef idx="2">
+            <a:schemeClr val="accent1">
+              <a:shade val="50000"/>
+            </a:schemeClr>
+          </a:lnRef>
+          <a:fillRef idx="1">
+            <a:schemeClr val="accent1"/>
+          </a:fillRef>
+          <a:effectRef idx="0">
+            <a:schemeClr val="accent1"/>
+          </a:effectRef>
+          <a:fontRef idx="minor">
+            <a:schemeClr val="lt1"/>
+          </a:fontRef>
+        </p:style>
+        <p:txBody>
+          <a:bodyPr rtlCol="0" anchor="ctr"/>
+          <a:lstStyle/>
+          <a:p>
+            <a:pPr algn="ctr"/>
+            <a:r>
+              <a:rPr lang="en-US" sz="6000" dirty="0"/>
+              <a:t>Design</a:t>
+            </a:r>
+          </a:p>
+        </p:txBody>
+      </p:sp>
+      <p:sp>
+        <p:nvSpPr>
+          <p:cNvPr id="10" name="Rectangle: Rounded Corners 9">
+            <a:extLst>
+              <a:ext uri="{FF2B5EF4-FFF2-40B4-BE49-F238E27FC236}">
+                <a16:creationId xmlns:a16="http://schemas.microsoft.com/office/drawing/2014/main" id="{56F5A00E-5553-4876-A279-BCF48EFD6163}"/>
+              </a:ext>
+            </a:extLst>
+          </p:cNvPr>
+          <p:cNvSpPr/>
+          <p:nvPr/>
+        </p:nvSpPr>
+        <p:spPr>
+          <a:xfrm>
+            <a:off x="15980219" y="4353097"/>
+            <a:ext cx="8839203" cy="26159070"/>
+          </a:xfrm>
+          <a:prstGeom prst="roundRect">
+            <a:avLst/>
+          </a:prstGeom>
+          <a:solidFill>
+            <a:schemeClr val="accent1">
+              <a:alpha val="70000"/>
+            </a:schemeClr>
+          </a:solidFill>
+        </p:spPr>
+        <p:style>
+          <a:lnRef idx="2">
+            <a:schemeClr val="accent1">
+              <a:shade val="50000"/>
+            </a:schemeClr>
+          </a:lnRef>
+          <a:fillRef idx="1">
+            <a:schemeClr val="accent1"/>
+          </a:fillRef>
+          <a:effectRef idx="0">
+            <a:schemeClr val="accent1"/>
+          </a:effectRef>
+          <a:fontRef idx="minor">
+            <a:schemeClr val="lt1"/>
+          </a:fontRef>
+        </p:style>
+        <p:txBody>
+          <a:bodyPr rtlCol="0" anchor="ctr"/>
+          <a:lstStyle/>
+          <a:p>
+            <a:pPr algn="ctr"/>
+            <a:r>
+              <a:rPr lang="en-US" sz="6000" dirty="0"/>
+              <a:t>Process</a:t>
+            </a:r>
+          </a:p>
+        </p:txBody>
+      </p:sp>
+      <p:sp>
+        <p:nvSpPr>
+          <p:cNvPr id="11" name="Rectangle: Rounded Corners 10">
+            <a:extLst>
+              <a:ext uri="{FF2B5EF4-FFF2-40B4-BE49-F238E27FC236}">
+                <a16:creationId xmlns:a16="http://schemas.microsoft.com/office/drawing/2014/main" id="{C87B49A2-D672-4971-B279-E620FB761D55}"/>
+              </a:ext>
+            </a:extLst>
+          </p:cNvPr>
+          <p:cNvSpPr/>
+          <p:nvPr/>
+        </p:nvSpPr>
+        <p:spPr>
+          <a:xfrm>
+            <a:off x="25516108" y="4440182"/>
+            <a:ext cx="8839203" cy="26159070"/>
+          </a:xfrm>
+          <a:prstGeom prst="roundRect">
+            <a:avLst/>
+          </a:prstGeom>
+          <a:solidFill>
+            <a:schemeClr val="accent1">
+              <a:alpha val="70000"/>
+            </a:schemeClr>
+          </a:solidFill>
+        </p:spPr>
+        <p:style>
+          <a:lnRef idx="2">
+            <a:schemeClr val="accent1">
+              <a:shade val="50000"/>
+            </a:schemeClr>
+          </a:lnRef>
+          <a:fillRef idx="1">
+            <a:schemeClr val="accent1"/>
+          </a:fillRef>
+          <a:effectRef idx="0">
+            <a:schemeClr val="accent1"/>
+          </a:effectRef>
+          <a:fontRef idx="minor">
+            <a:schemeClr val="lt1"/>
+          </a:fontRef>
+        </p:style>
+        <p:txBody>
+          <a:bodyPr rtlCol="0" anchor="ctr"/>
+          <a:lstStyle/>
+          <a:p>
+            <a:pPr algn="ctr"/>
+            <a:r>
+              <a:rPr lang="en-US" sz="6000" dirty="0"/>
+              <a:t>Results</a:t>
+            </a:r>
+          </a:p>
+        </p:txBody>
+      </p:sp>
+      <p:sp>
+        <p:nvSpPr>
+          <p:cNvPr id="12" name="Rectangle: Rounded Corners 11">
+            <a:extLst>
+              <a:ext uri="{FF2B5EF4-FFF2-40B4-BE49-F238E27FC236}">
+                <a16:creationId xmlns:a16="http://schemas.microsoft.com/office/drawing/2014/main" id="{859E30F0-9C1B-40CB-9078-31D11E5BDC10}"/>
+              </a:ext>
+            </a:extLst>
+          </p:cNvPr>
+          <p:cNvSpPr/>
+          <p:nvPr/>
+        </p:nvSpPr>
+        <p:spPr>
+          <a:xfrm>
+            <a:off x="35051997" y="4483725"/>
+            <a:ext cx="8839203" cy="26159070"/>
+          </a:xfrm>
+          <a:prstGeom prst="roundRect">
+            <a:avLst/>
+          </a:prstGeom>
+          <a:solidFill>
+            <a:schemeClr val="accent1">
+              <a:alpha val="70000"/>
+            </a:schemeClr>
+          </a:solidFill>
+        </p:spPr>
+        <p:style>
+          <a:lnRef idx="2">
+            <a:schemeClr val="accent1">
+              <a:shade val="50000"/>
+            </a:schemeClr>
+          </a:lnRef>
+          <a:fillRef idx="1">
+            <a:schemeClr val="accent1"/>
+          </a:fillRef>
+          <a:effectRef idx="0">
+            <a:schemeClr val="accent1"/>
+          </a:effectRef>
+          <a:fontRef idx="minor">
+            <a:schemeClr val="lt1"/>
+          </a:fontRef>
+        </p:style>
+        <p:txBody>
+          <a:bodyPr rtlCol="0" anchor="ctr"/>
+          <a:lstStyle/>
+          <a:p>
+            <a:pPr algn="ctr"/>
+            <a:r>
+              <a:rPr lang="en-US" sz="6000" dirty="0"/>
+              <a:t>Conclusion</a:t>
+            </a:r>
+          </a:p>
+        </p:txBody>
+      </p:sp>
     </p:spTree>
     <p:extLst>
       <p:ext uri="{BB962C8B-B14F-4D97-AF65-F5344CB8AC3E}">
         <p14:creationId xmlns:p14="http://schemas.microsoft.com/office/powerpoint/2010/main" val="813782525"/>
+      </p:ext>
+    </p:extLst>
+  </p:cSld>
+  <p:clrMapOvr>
+    <a:masterClrMapping/>
+  </p:clrMapOvr>
+</p:sld>
+</file>
+
+<file path=ppt/slides/slide2.xml><?xml version="1.0" encoding="utf-8"?>
+<p:sld xmlns:a="http://schemas.openxmlformats.org/drawingml/2006/main" xmlns:r="http://schemas.openxmlformats.org/officeDocument/2006/relationships" xmlns:p="http://schemas.openxmlformats.org/presentationml/2006/main">
+  <p:cSld>
+    <p:bg>
+      <p:bgPr>
+        <a:solidFill>
+          <a:schemeClr val="bg1"/>
+        </a:solidFill>
+        <a:effectLst/>
+      </p:bgPr>
+    </p:bg>
+    <p:spTree>
+      <p:nvGrpSpPr>
+        <p:cNvPr id="1" name=""/>
+        <p:cNvGrpSpPr/>
+        <p:nvPr/>
+      </p:nvGrpSpPr>
+      <p:grpSpPr>
+        <a:xfrm>
+          <a:off x="0" y="0"/>
+          <a:ext cx="0" cy="0"/>
+          <a:chOff x="0" y="0"/>
+          <a:chExt cx="0" cy="0"/>
+        </a:xfrm>
+      </p:grpSpPr>
+      <p:sp>
+        <p:nvSpPr>
+          <p:cNvPr id="10" name="Rectangle 9">
+            <a:extLst>
+              <a:ext uri="{FF2B5EF4-FFF2-40B4-BE49-F238E27FC236}">
+                <a16:creationId xmlns:a16="http://schemas.microsoft.com/office/drawing/2014/main" id="{42A4FC2C-047E-45A5-965D-8E1E3BF09BC6}"/>
+              </a:ext>
+              <a:ext uri="{C183D7F6-B498-43B3-948B-1728B52AA6E4}">
+                <adec:decorative xmlns:adec="http://schemas.microsoft.com/office/drawing/2017/decorative" val="1"/>
+              </a:ext>
+            </a:extLst>
+          </p:cNvPr>
+          <p:cNvSpPr>
+            <a:spLocks noGrp="1" noRot="1" noChangeAspect="1" noMove="1" noResize="1" noEditPoints="1" noAdjustHandles="1" noChangeArrowheads="1" noChangeShapeType="1" noTextEdit="1"/>
+          </p:cNvSpPr>
+          <p:nvPr>
+            <p:extLst>
+              <p:ext uri="{386F3935-93C4-4BCD-93E2-E3B085C9AB24}">
+                <p16:designElem xmlns:p16="http://schemas.microsoft.com/office/powerpoint/2015/main" val="1"/>
+              </p:ext>
+            </p:extLst>
+          </p:nvPr>
+        </p:nvSpPr>
+        <p:spPr bwMode="white">
+          <a:xfrm>
+            <a:off x="5486" y="0"/>
+            <a:ext cx="43880227" cy="32918400"/>
+          </a:xfrm>
+          <a:prstGeom prst="rect">
+            <a:avLst/>
+          </a:prstGeom>
+          <a:noFill/>
+          <a:ln>
+            <a:noFill/>
+          </a:ln>
+        </p:spPr>
+        <p:style>
+          <a:lnRef idx="2">
+            <a:schemeClr val="accent1">
+              <a:shade val="50000"/>
+            </a:schemeClr>
+          </a:lnRef>
+          <a:fillRef idx="1">
+            <a:schemeClr val="accent1"/>
+          </a:fillRef>
+          <a:effectRef idx="0">
+            <a:schemeClr val="accent1"/>
+          </a:effectRef>
+          <a:fontRef idx="minor">
+            <a:schemeClr val="lt1"/>
+          </a:fontRef>
+        </p:style>
+        <p:txBody>
+          <a:bodyPr rtlCol="0" anchor="ctr"/>
+          <a:lstStyle>
+            <a:defPPr>
+              <a:defRPr lang="en-US"/>
+            </a:defPPr>
+            <a:lvl1pPr marL="0" algn="l" defTabSz="914400" rtl="0" eaLnBrk="1" latinLnBrk="0" hangingPunct="1">
+              <a:defRPr sz="1800" kern="1200">
+                <a:solidFill>
+                  <a:schemeClr val="lt1"/>
+                </a:solidFill>
+                <a:latin typeface="+mn-lt"/>
+                <a:ea typeface="+mn-ea"/>
+                <a:cs typeface="+mn-cs"/>
+              </a:defRPr>
+            </a:lvl1pPr>
+            <a:lvl2pPr marL="457200" algn="l" defTabSz="914400" rtl="0" eaLnBrk="1" latinLnBrk="0" hangingPunct="1">
+              <a:defRPr sz="1800" kern="1200">
+                <a:solidFill>
+                  <a:schemeClr val="lt1"/>
+                </a:solidFill>
+                <a:latin typeface="+mn-lt"/>
+                <a:ea typeface="+mn-ea"/>
+                <a:cs typeface="+mn-cs"/>
+              </a:defRPr>
+            </a:lvl2pPr>
+            <a:lvl3pPr marL="914400" algn="l" defTabSz="914400" rtl="0" eaLnBrk="1" latinLnBrk="0" hangingPunct="1">
+              <a:defRPr sz="1800" kern="1200">
+                <a:solidFill>
+                  <a:schemeClr val="lt1"/>
+                </a:solidFill>
+                <a:latin typeface="+mn-lt"/>
+                <a:ea typeface="+mn-ea"/>
+                <a:cs typeface="+mn-cs"/>
+              </a:defRPr>
+            </a:lvl3pPr>
+            <a:lvl4pPr marL="1371600" algn="l" defTabSz="914400" rtl="0" eaLnBrk="1" latinLnBrk="0" hangingPunct="1">
+              <a:defRPr sz="1800" kern="1200">
+                <a:solidFill>
+                  <a:schemeClr val="lt1"/>
+                </a:solidFill>
+                <a:latin typeface="+mn-lt"/>
+                <a:ea typeface="+mn-ea"/>
+                <a:cs typeface="+mn-cs"/>
+              </a:defRPr>
+            </a:lvl4pPr>
+            <a:lvl5pPr marL="1828800" algn="l" defTabSz="914400" rtl="0" eaLnBrk="1" latinLnBrk="0" hangingPunct="1">
+              <a:defRPr sz="1800" kern="1200">
+                <a:solidFill>
+                  <a:schemeClr val="lt1"/>
+                </a:solidFill>
+                <a:latin typeface="+mn-lt"/>
+                <a:ea typeface="+mn-ea"/>
+                <a:cs typeface="+mn-cs"/>
+              </a:defRPr>
+            </a:lvl5pPr>
+            <a:lvl6pPr marL="2286000" algn="l" defTabSz="914400" rtl="0" eaLnBrk="1" latinLnBrk="0" hangingPunct="1">
+              <a:defRPr sz="1800" kern="1200">
+                <a:solidFill>
+                  <a:schemeClr val="lt1"/>
+                </a:solidFill>
+                <a:latin typeface="+mn-lt"/>
+                <a:ea typeface="+mn-ea"/>
+                <a:cs typeface="+mn-cs"/>
+              </a:defRPr>
+            </a:lvl6pPr>
+            <a:lvl7pPr marL="2743200" algn="l" defTabSz="914400" rtl="0" eaLnBrk="1" latinLnBrk="0" hangingPunct="1">
+              <a:defRPr sz="1800" kern="1200">
+                <a:solidFill>
+                  <a:schemeClr val="lt1"/>
+                </a:solidFill>
+                <a:latin typeface="+mn-lt"/>
+                <a:ea typeface="+mn-ea"/>
+                <a:cs typeface="+mn-cs"/>
+              </a:defRPr>
+            </a:lvl7pPr>
+            <a:lvl8pPr marL="3200400" algn="l" defTabSz="914400" rtl="0" eaLnBrk="1" latinLnBrk="0" hangingPunct="1">
+              <a:defRPr sz="1800" kern="1200">
+                <a:solidFill>
+                  <a:schemeClr val="lt1"/>
+                </a:solidFill>
+                <a:latin typeface="+mn-lt"/>
+                <a:ea typeface="+mn-ea"/>
+                <a:cs typeface="+mn-cs"/>
+              </a:defRPr>
+            </a:lvl8pPr>
+            <a:lvl9pPr marL="3657600" algn="l" defTabSz="914400" rtl="0" eaLnBrk="1" latinLnBrk="0" hangingPunct="1">
+              <a:defRPr sz="1800" kern="1200">
+                <a:solidFill>
+                  <a:schemeClr val="lt1"/>
+                </a:solidFill>
+                <a:latin typeface="+mn-lt"/>
+                <a:ea typeface="+mn-ea"/>
+                <a:cs typeface="+mn-cs"/>
+              </a:defRPr>
+            </a:lvl9pPr>
+          </a:lstStyle>
+          <a:p>
+            <a:pPr algn="ctr"/>
+            <a:endParaRPr lang="en-US"/>
+          </a:p>
+        </p:txBody>
+      </p:sp>
+      <p:pic>
+        <p:nvPicPr>
+          <p:cNvPr id="5" name="Picture 4" descr="Timeline&#10;&#10;Description automatically generated">
+            <a:extLst>
+              <a:ext uri="{FF2B5EF4-FFF2-40B4-BE49-F238E27FC236}">
+                <a16:creationId xmlns:a16="http://schemas.microsoft.com/office/drawing/2014/main" id="{474ED9B0-395B-4AEF-9F1C-F43DB424F95D}"/>
+              </a:ext>
+            </a:extLst>
+          </p:cNvPr>
+          <p:cNvPicPr>
+            <a:picLocks noChangeAspect="1"/>
+          </p:cNvPicPr>
+          <p:nvPr/>
+        </p:nvPicPr>
+        <p:blipFill rotWithShape="1">
+          <a:blip r:embed="rId2">
+            <a:extLst>
+              <a:ext uri="{28A0092B-C50C-407E-A947-70E740481C1C}">
+                <a14:useLocalDpi xmlns:a14="http://schemas.microsoft.com/office/drawing/2010/main" val="0"/>
+              </a:ext>
+            </a:extLst>
+          </a:blip>
+          <a:srcRect t="7409" b="24166"/>
+          <a:stretch/>
+        </p:blipFill>
+        <p:spPr>
+          <a:xfrm>
+            <a:off x="-5467" y="6153"/>
+            <a:ext cx="43891180" cy="32912247"/>
+          </a:xfrm>
+          <a:prstGeom prst="rect">
+            <a:avLst/>
+          </a:prstGeom>
+        </p:spPr>
+      </p:pic>
+    </p:spTree>
+    <p:extLst>
+      <p:ext uri="{BB962C8B-B14F-4D97-AF65-F5344CB8AC3E}">
+        <p14:creationId xmlns:p14="http://schemas.microsoft.com/office/powerpoint/2010/main" val="2573592561"/>
       </p:ext>
     </p:extLst>
   </p:cSld>

</xml_diff>